<commit_message>
TRC 04 IDE 04
</commit_message>
<xml_diff>
--- a/training-cards/agile moves/Ideas (IDE)/ger/apprentice/ger_IDE_04_Idea_Snake_AM_A.pptx
+++ b/training-cards/agile moves/Ideas (IDE)/ger/apprentice/ger_IDE_04_Idea_Snake_AM_A.pptx
@@ -1104,7 +1104,7 @@
                 <a:latin typeface="Avenir Light"/>
                 <a:cs typeface="Avenir Light"/>
               </a:rPr>
-              <a:t>09.11.15</a:t>
+              <a:t>16.11.15</a:t>
             </a:fld>
             <a:endParaRPr lang="de-DE" sz="600" dirty="0">
               <a:solidFill>
@@ -1768,7 +1768,7 @@
                 <a:latin typeface="Avenir Light"/>
                 <a:cs typeface="Avenir Light"/>
               </a:rPr>
-              <a:t>09.11.15</a:t>
+              <a:t>16.11.15</a:t>
             </a:fld>
             <a:endParaRPr lang="de-DE" sz="600" dirty="0">
               <a:solidFill>
@@ -2497,7 +2497,7 @@
                 <a:latin typeface="Avenir Light"/>
                 <a:cs typeface="Avenir Light"/>
               </a:rPr>
-              <a:t>09.11.15</a:t>
+              <a:t>16.11.15</a:t>
             </a:fld>
             <a:endParaRPr lang="de-DE" sz="600" dirty="0">
               <a:solidFill>
@@ -3910,18 +3910,18 @@
               <a:t>Ein kontinuierlicher </a:t>
             </a:r>
             <a:r>
-              <a:rPr lang="de-DE" sz="1200" dirty="0" err="1">
+              <a:rPr lang="de-DE" sz="1200" dirty="0" smtClean="0">
                 <a:latin typeface="Avenir Light"/>
                 <a:cs typeface="Avenir Light"/>
               </a:rPr>
-              <a:t>Ideenfluß</a:t>
+              <a:t>Ideenfluss </a:t>
             </a:r>
             <a:r>
               <a:rPr lang="de-DE" sz="1200" dirty="0">
                 <a:latin typeface="Avenir Light"/>
                 <a:cs typeface="Avenir Light"/>
               </a:rPr>
-              <a:t> ist für alle im Team eine ständige Quelle der </a:t>
+              <a:t>ist für alle im Team eine ständige Quelle der </a:t>
             </a:r>
             <a:r>
               <a:rPr lang="de-DE" sz="1200" dirty="0" smtClean="0">

</xml_diff>